<commit_message>
this is all the changes
</commit_message>
<xml_diff>
--- a/קבצים נוספים וחשובים/help/forPresent.pptx
+++ b/קבצים נוספים וחשובים/help/forPresent.pptx
@@ -4,6 +4,10 @@
   <p:sldMasterIdLst>
     <p:sldMasterId id="2147483648" r:id="rId1"/>
   </p:sldMasterIdLst>
+  <p:sldIdLst>
+    <p:sldId id="256" r:id="rId2"/>
+    <p:sldId id="257" r:id="rId3"/>
+  </p:sldIdLst>
   <p:sldSz cx="9144000" cy="6858000" type="screen4x3"/>
   <p:notesSz cx="6858000" cy="9144000"/>
   <p:defaultTextStyle>
@@ -101,6 +105,22 @@
       </a:defRPr>
     </a:lvl9pPr>
   </p:defaultTextStyle>
+  <p:extLst>
+    <p:ext uri="{EFAFB233-063F-42B5-8137-9DF3F51BA10A}">
+      <p15:sldGuideLst xmlns:p15="http://schemas.microsoft.com/office/powerpoint/2012/main">
+        <p15:guide id="1" orient="horz" pos="2160">
+          <p15:clr>
+            <a:srgbClr val="A4A3A4"/>
+          </p15:clr>
+        </p15:guide>
+        <p15:guide id="2" pos="2880">
+          <p15:clr>
+            <a:srgbClr val="A4A3A4"/>
+          </p15:clr>
+        </p15:guide>
+      </p15:sldGuideLst>
+    </p:ext>
+  </p:extLst>
 </p:presentation>
 </file>
 
@@ -142,10 +162,9 @@
           <a:lstStyle/>
           <a:p>
             <a:r>
-              <a:rPr lang="he-IL" smtClean="0"/>
+              <a:rPr lang="he-IL"/>
               <a:t>לחץ כדי לערוך סגנון כותרת של תבנית בסיס</a:t>
             </a:r>
-            <a:endParaRPr lang="he-IL"/>
           </a:p>
         </p:txBody>
       </p:sp>
@@ -261,10 +280,9 @@
           </a:lstStyle>
           <a:p>
             <a:r>
-              <a:rPr lang="he-IL" smtClean="0"/>
+              <a:rPr lang="he-IL"/>
               <a:t>לחץ כדי לערוך סגנון כותרת משנה של תבנית בסיס</a:t>
             </a:r>
-            <a:endParaRPr lang="he-IL"/>
           </a:p>
         </p:txBody>
       </p:sp>
@@ -285,7 +303,7 @@
           <a:p>
             <a:fld id="{4E7438E1-117D-44FB-AC24-B79D899BA877}" type="datetimeFigureOut">
               <a:rPr lang="he-IL" smtClean="0"/>
-              <a:t>ט"ו/אלול/תשס"ו</a:t>
+              <a:t>ט'/ניסן/תשפ"א</a:t>
             </a:fld>
             <a:endParaRPr lang="he-IL"/>
           </a:p>
@@ -374,10 +392,9 @@
           <a:lstStyle/>
           <a:p>
             <a:r>
-              <a:rPr lang="he-IL" smtClean="0"/>
+              <a:rPr lang="he-IL"/>
               <a:t>לחץ כדי לערוך סגנון כותרת של תבנית בסיס</a:t>
             </a:r>
-            <a:endParaRPr lang="he-IL"/>
           </a:p>
         </p:txBody>
       </p:sp>
@@ -398,38 +415,37 @@
           <a:p>
             <a:pPr lvl="0"/>
             <a:r>
-              <a:rPr lang="he-IL" smtClean="0"/>
+              <a:rPr lang="he-IL"/>
               <a:t>לחץ כדי לערוך סגנונות טקסט של תבנית בסיס</a:t>
             </a:r>
           </a:p>
           <a:p>
             <a:pPr lvl="1"/>
             <a:r>
-              <a:rPr lang="he-IL" smtClean="0"/>
+              <a:rPr lang="he-IL"/>
               <a:t>רמה שנייה</a:t>
             </a:r>
           </a:p>
           <a:p>
             <a:pPr lvl="2"/>
             <a:r>
-              <a:rPr lang="he-IL" smtClean="0"/>
+              <a:rPr lang="he-IL"/>
               <a:t>רמה שלישית</a:t>
             </a:r>
           </a:p>
           <a:p>
             <a:pPr lvl="3"/>
             <a:r>
-              <a:rPr lang="he-IL" smtClean="0"/>
+              <a:rPr lang="he-IL"/>
               <a:t>רמה רביעית</a:t>
             </a:r>
           </a:p>
           <a:p>
             <a:pPr lvl="4"/>
             <a:r>
-              <a:rPr lang="he-IL" smtClean="0"/>
+              <a:rPr lang="he-IL"/>
               <a:t>רמה חמישית</a:t>
             </a:r>
-            <a:endParaRPr lang="he-IL"/>
           </a:p>
         </p:txBody>
       </p:sp>
@@ -450,7 +466,7 @@
           <a:p>
             <a:fld id="{4E7438E1-117D-44FB-AC24-B79D899BA877}" type="datetimeFigureOut">
               <a:rPr lang="he-IL" smtClean="0"/>
-              <a:t>ט"ו/אלול/תשס"ו</a:t>
+              <a:t>ט'/ניסן/תשפ"א</a:t>
             </a:fld>
             <a:endParaRPr lang="he-IL"/>
           </a:p>
@@ -544,10 +560,9 @@
           <a:lstStyle/>
           <a:p>
             <a:r>
-              <a:rPr lang="he-IL" smtClean="0"/>
+              <a:rPr lang="he-IL"/>
               <a:t>לחץ כדי לערוך סגנון כותרת של תבנית בסיס</a:t>
             </a:r>
-            <a:endParaRPr lang="he-IL"/>
           </a:p>
         </p:txBody>
       </p:sp>
@@ -573,38 +588,37 @@
           <a:p>
             <a:pPr lvl="0"/>
             <a:r>
-              <a:rPr lang="he-IL" smtClean="0"/>
+              <a:rPr lang="he-IL"/>
               <a:t>לחץ כדי לערוך סגנונות טקסט של תבנית בסיס</a:t>
             </a:r>
           </a:p>
           <a:p>
             <a:pPr lvl="1"/>
             <a:r>
-              <a:rPr lang="he-IL" smtClean="0"/>
+              <a:rPr lang="he-IL"/>
               <a:t>רמה שנייה</a:t>
             </a:r>
           </a:p>
           <a:p>
             <a:pPr lvl="2"/>
             <a:r>
-              <a:rPr lang="he-IL" smtClean="0"/>
+              <a:rPr lang="he-IL"/>
               <a:t>רמה שלישית</a:t>
             </a:r>
           </a:p>
           <a:p>
             <a:pPr lvl="3"/>
             <a:r>
-              <a:rPr lang="he-IL" smtClean="0"/>
+              <a:rPr lang="he-IL"/>
               <a:t>רמה רביעית</a:t>
             </a:r>
           </a:p>
           <a:p>
             <a:pPr lvl="4"/>
             <a:r>
-              <a:rPr lang="he-IL" smtClean="0"/>
+              <a:rPr lang="he-IL"/>
               <a:t>רמה חמישית</a:t>
             </a:r>
-            <a:endParaRPr lang="he-IL"/>
           </a:p>
         </p:txBody>
       </p:sp>
@@ -625,7 +639,7 @@
           <a:p>
             <a:fld id="{4E7438E1-117D-44FB-AC24-B79D899BA877}" type="datetimeFigureOut">
               <a:rPr lang="he-IL" smtClean="0"/>
-              <a:t>ט"ו/אלול/תשס"ו</a:t>
+              <a:t>ט'/ניסן/תשפ"א</a:t>
             </a:fld>
             <a:endParaRPr lang="he-IL"/>
           </a:p>
@@ -714,10 +728,9 @@
           <a:lstStyle/>
           <a:p>
             <a:r>
-              <a:rPr lang="he-IL" smtClean="0"/>
+              <a:rPr lang="he-IL"/>
               <a:t>לחץ כדי לערוך סגנון כותרת של תבנית בסיס</a:t>
             </a:r>
-            <a:endParaRPr lang="he-IL"/>
           </a:p>
         </p:txBody>
       </p:sp>
@@ -738,38 +751,37 @@
           <a:p>
             <a:pPr lvl="0"/>
             <a:r>
-              <a:rPr lang="he-IL" smtClean="0"/>
+              <a:rPr lang="he-IL"/>
               <a:t>לחץ כדי לערוך סגנונות טקסט של תבנית בסיס</a:t>
             </a:r>
           </a:p>
           <a:p>
             <a:pPr lvl="1"/>
             <a:r>
-              <a:rPr lang="he-IL" smtClean="0"/>
+              <a:rPr lang="he-IL"/>
               <a:t>רמה שנייה</a:t>
             </a:r>
           </a:p>
           <a:p>
             <a:pPr lvl="2"/>
             <a:r>
-              <a:rPr lang="he-IL" smtClean="0"/>
+              <a:rPr lang="he-IL"/>
               <a:t>רמה שלישית</a:t>
             </a:r>
           </a:p>
           <a:p>
             <a:pPr lvl="3"/>
             <a:r>
-              <a:rPr lang="he-IL" smtClean="0"/>
+              <a:rPr lang="he-IL"/>
               <a:t>רמה רביעית</a:t>
             </a:r>
           </a:p>
           <a:p>
             <a:pPr lvl="4"/>
             <a:r>
-              <a:rPr lang="he-IL" smtClean="0"/>
+              <a:rPr lang="he-IL"/>
               <a:t>רמה חמישית</a:t>
             </a:r>
-            <a:endParaRPr lang="he-IL"/>
           </a:p>
         </p:txBody>
       </p:sp>
@@ -790,7 +802,7 @@
           <a:p>
             <a:fld id="{4E7438E1-117D-44FB-AC24-B79D899BA877}" type="datetimeFigureOut">
               <a:rPr lang="he-IL" smtClean="0"/>
-              <a:t>ט"ו/אלול/תשס"ו</a:t>
+              <a:t>ט'/ניסן/תשפ"א</a:t>
             </a:fld>
             <a:endParaRPr lang="he-IL"/>
           </a:p>
@@ -888,10 +900,9 @@
           </a:lstStyle>
           <a:p>
             <a:r>
-              <a:rPr lang="he-IL" smtClean="0"/>
+              <a:rPr lang="he-IL"/>
               <a:t>לחץ כדי לערוך סגנון כותרת של תבנית בסיס</a:t>
             </a:r>
-            <a:endParaRPr lang="he-IL"/>
           </a:p>
         </p:txBody>
       </p:sp>
@@ -1008,7 +1019,7 @@
           <a:p>
             <a:pPr lvl="0"/>
             <a:r>
-              <a:rPr lang="he-IL" smtClean="0"/>
+              <a:rPr lang="he-IL"/>
               <a:t>לחץ כדי לערוך סגנונות טקסט של תבנית בסיס</a:t>
             </a:r>
           </a:p>
@@ -1031,7 +1042,7 @@
           <a:p>
             <a:fld id="{4E7438E1-117D-44FB-AC24-B79D899BA877}" type="datetimeFigureOut">
               <a:rPr lang="he-IL" smtClean="0"/>
-              <a:t>ט"ו/אלול/תשס"ו</a:t>
+              <a:t>ט'/ניסן/תשפ"א</a:t>
             </a:fld>
             <a:endParaRPr lang="he-IL"/>
           </a:p>
@@ -1120,10 +1131,9 @@
           <a:lstStyle/>
           <a:p>
             <a:r>
-              <a:rPr lang="he-IL" smtClean="0"/>
+              <a:rPr lang="he-IL"/>
               <a:t>לחץ כדי לערוך סגנון כותרת של תבנית בסיס</a:t>
             </a:r>
-            <a:endParaRPr lang="he-IL"/>
           </a:p>
         </p:txBody>
       </p:sp>
@@ -1177,38 +1187,37 @@
           <a:p>
             <a:pPr lvl="0"/>
             <a:r>
-              <a:rPr lang="he-IL" smtClean="0"/>
+              <a:rPr lang="he-IL"/>
               <a:t>לחץ כדי לערוך סגנונות טקסט של תבנית בסיס</a:t>
             </a:r>
           </a:p>
           <a:p>
             <a:pPr lvl="1"/>
             <a:r>
-              <a:rPr lang="he-IL" smtClean="0"/>
+              <a:rPr lang="he-IL"/>
               <a:t>רמה שנייה</a:t>
             </a:r>
           </a:p>
           <a:p>
             <a:pPr lvl="2"/>
             <a:r>
-              <a:rPr lang="he-IL" smtClean="0"/>
+              <a:rPr lang="he-IL"/>
               <a:t>רמה שלישית</a:t>
             </a:r>
           </a:p>
           <a:p>
             <a:pPr lvl="3"/>
             <a:r>
-              <a:rPr lang="he-IL" smtClean="0"/>
+              <a:rPr lang="he-IL"/>
               <a:t>רמה רביעית</a:t>
             </a:r>
           </a:p>
           <a:p>
             <a:pPr lvl="4"/>
             <a:r>
-              <a:rPr lang="he-IL" smtClean="0"/>
+              <a:rPr lang="he-IL"/>
               <a:t>רמה חמישית</a:t>
             </a:r>
-            <a:endParaRPr lang="he-IL"/>
           </a:p>
         </p:txBody>
       </p:sp>
@@ -1262,38 +1271,37 @@
           <a:p>
             <a:pPr lvl="0"/>
             <a:r>
-              <a:rPr lang="he-IL" smtClean="0"/>
+              <a:rPr lang="he-IL"/>
               <a:t>לחץ כדי לערוך סגנונות טקסט של תבנית בסיס</a:t>
             </a:r>
           </a:p>
           <a:p>
             <a:pPr lvl="1"/>
             <a:r>
-              <a:rPr lang="he-IL" smtClean="0"/>
+              <a:rPr lang="he-IL"/>
               <a:t>רמה שנייה</a:t>
             </a:r>
           </a:p>
           <a:p>
             <a:pPr lvl="2"/>
             <a:r>
-              <a:rPr lang="he-IL" smtClean="0"/>
+              <a:rPr lang="he-IL"/>
               <a:t>רמה שלישית</a:t>
             </a:r>
           </a:p>
           <a:p>
             <a:pPr lvl="3"/>
             <a:r>
-              <a:rPr lang="he-IL" smtClean="0"/>
+              <a:rPr lang="he-IL"/>
               <a:t>רמה רביעית</a:t>
             </a:r>
           </a:p>
           <a:p>
             <a:pPr lvl="4"/>
             <a:r>
-              <a:rPr lang="he-IL" smtClean="0"/>
+              <a:rPr lang="he-IL"/>
               <a:t>רמה חמישית</a:t>
             </a:r>
-            <a:endParaRPr lang="he-IL"/>
           </a:p>
         </p:txBody>
       </p:sp>
@@ -1314,7 +1322,7 @@
           <a:p>
             <a:fld id="{4E7438E1-117D-44FB-AC24-B79D899BA877}" type="datetimeFigureOut">
               <a:rPr lang="he-IL" smtClean="0"/>
-              <a:t>ט"ו/אלול/תשס"ו</a:t>
+              <a:t>ט'/ניסן/תשפ"א</a:t>
             </a:fld>
             <a:endParaRPr lang="he-IL"/>
           </a:p>
@@ -1407,10 +1415,9 @@
           </a:lstStyle>
           <a:p>
             <a:r>
-              <a:rPr lang="he-IL" smtClean="0"/>
+              <a:rPr lang="he-IL"/>
               <a:t>לחץ כדי לערוך סגנון כותרת של תבנית בסיס</a:t>
             </a:r>
-            <a:endParaRPr lang="he-IL"/>
           </a:p>
         </p:txBody>
       </p:sp>
@@ -1473,7 +1480,7 @@
           <a:p>
             <a:pPr lvl="0"/>
             <a:r>
-              <a:rPr lang="he-IL" smtClean="0"/>
+              <a:rPr lang="he-IL"/>
               <a:t>לחץ כדי לערוך סגנונות טקסט של תבנית בסיס</a:t>
             </a:r>
           </a:p>
@@ -1529,38 +1536,37 @@
           <a:p>
             <a:pPr lvl="0"/>
             <a:r>
-              <a:rPr lang="he-IL" smtClean="0"/>
+              <a:rPr lang="he-IL"/>
               <a:t>לחץ כדי לערוך סגנונות טקסט של תבנית בסיס</a:t>
             </a:r>
           </a:p>
           <a:p>
             <a:pPr lvl="1"/>
             <a:r>
-              <a:rPr lang="he-IL" smtClean="0"/>
+              <a:rPr lang="he-IL"/>
               <a:t>רמה שנייה</a:t>
             </a:r>
           </a:p>
           <a:p>
             <a:pPr lvl="2"/>
             <a:r>
-              <a:rPr lang="he-IL" smtClean="0"/>
+              <a:rPr lang="he-IL"/>
               <a:t>רמה שלישית</a:t>
             </a:r>
           </a:p>
           <a:p>
             <a:pPr lvl="3"/>
             <a:r>
-              <a:rPr lang="he-IL" smtClean="0"/>
+              <a:rPr lang="he-IL"/>
               <a:t>רמה רביעית</a:t>
             </a:r>
           </a:p>
           <a:p>
             <a:pPr lvl="4"/>
             <a:r>
-              <a:rPr lang="he-IL" smtClean="0"/>
+              <a:rPr lang="he-IL"/>
               <a:t>רמה חמישית</a:t>
             </a:r>
-            <a:endParaRPr lang="he-IL"/>
           </a:p>
         </p:txBody>
       </p:sp>
@@ -1623,7 +1629,7 @@
           <a:p>
             <a:pPr lvl="0"/>
             <a:r>
-              <a:rPr lang="he-IL" smtClean="0"/>
+              <a:rPr lang="he-IL"/>
               <a:t>לחץ כדי לערוך סגנונות טקסט של תבנית בסיס</a:t>
             </a:r>
           </a:p>
@@ -1679,38 +1685,37 @@
           <a:p>
             <a:pPr lvl="0"/>
             <a:r>
-              <a:rPr lang="he-IL" smtClean="0"/>
+              <a:rPr lang="he-IL"/>
               <a:t>לחץ כדי לערוך סגנונות טקסט של תבנית בסיס</a:t>
             </a:r>
           </a:p>
           <a:p>
             <a:pPr lvl="1"/>
             <a:r>
-              <a:rPr lang="he-IL" smtClean="0"/>
+              <a:rPr lang="he-IL"/>
               <a:t>רמה שנייה</a:t>
             </a:r>
           </a:p>
           <a:p>
             <a:pPr lvl="2"/>
             <a:r>
-              <a:rPr lang="he-IL" smtClean="0"/>
+              <a:rPr lang="he-IL"/>
               <a:t>רמה שלישית</a:t>
             </a:r>
           </a:p>
           <a:p>
             <a:pPr lvl="3"/>
             <a:r>
-              <a:rPr lang="he-IL" smtClean="0"/>
+              <a:rPr lang="he-IL"/>
               <a:t>רמה רביעית</a:t>
             </a:r>
           </a:p>
           <a:p>
             <a:pPr lvl="4"/>
             <a:r>
-              <a:rPr lang="he-IL" smtClean="0"/>
+              <a:rPr lang="he-IL"/>
               <a:t>רמה חמישית</a:t>
             </a:r>
-            <a:endParaRPr lang="he-IL"/>
           </a:p>
         </p:txBody>
       </p:sp>
@@ -1731,7 +1736,7 @@
           <a:p>
             <a:fld id="{4E7438E1-117D-44FB-AC24-B79D899BA877}" type="datetimeFigureOut">
               <a:rPr lang="he-IL" smtClean="0"/>
-              <a:t>ט"ו/אלול/תשס"ו</a:t>
+              <a:t>ט'/ניסן/תשפ"א</a:t>
             </a:fld>
             <a:endParaRPr lang="he-IL"/>
           </a:p>
@@ -1820,10 +1825,9 @@
           <a:lstStyle/>
           <a:p>
             <a:r>
-              <a:rPr lang="he-IL" smtClean="0"/>
+              <a:rPr lang="he-IL"/>
               <a:t>לחץ כדי לערוך סגנון כותרת של תבנית בסיס</a:t>
             </a:r>
-            <a:endParaRPr lang="he-IL"/>
           </a:p>
         </p:txBody>
       </p:sp>
@@ -1844,7 +1848,7 @@
           <a:p>
             <a:fld id="{4E7438E1-117D-44FB-AC24-B79D899BA877}" type="datetimeFigureOut">
               <a:rPr lang="he-IL" smtClean="0"/>
-              <a:t>ט"ו/אלול/תשס"ו</a:t>
+              <a:t>ט'/ניסן/תשפ"א</a:t>
             </a:fld>
             <a:endParaRPr lang="he-IL"/>
           </a:p>
@@ -1934,7 +1938,7 @@
           <a:p>
             <a:fld id="{4E7438E1-117D-44FB-AC24-B79D899BA877}" type="datetimeFigureOut">
               <a:rPr lang="he-IL" smtClean="0"/>
-              <a:t>ט"ו/אלול/תשס"ו</a:t>
+              <a:t>ט'/ניסן/תשפ"א</a:t>
             </a:fld>
             <a:endParaRPr lang="he-IL"/>
           </a:p>
@@ -2032,10 +2036,9 @@
           </a:lstStyle>
           <a:p>
             <a:r>
-              <a:rPr lang="he-IL" smtClean="0"/>
+              <a:rPr lang="he-IL"/>
               <a:t>לחץ כדי לערוך סגנון כותרת של תבנית בסיס</a:t>
             </a:r>
-            <a:endParaRPr lang="he-IL"/>
           </a:p>
         </p:txBody>
       </p:sp>
@@ -2089,38 +2092,37 @@
           <a:p>
             <a:pPr lvl="0"/>
             <a:r>
-              <a:rPr lang="he-IL" smtClean="0"/>
+              <a:rPr lang="he-IL"/>
               <a:t>לחץ כדי לערוך סגנונות טקסט של תבנית בסיס</a:t>
             </a:r>
           </a:p>
           <a:p>
             <a:pPr lvl="1"/>
             <a:r>
-              <a:rPr lang="he-IL" smtClean="0"/>
+              <a:rPr lang="he-IL"/>
               <a:t>רמה שנייה</a:t>
             </a:r>
           </a:p>
           <a:p>
             <a:pPr lvl="2"/>
             <a:r>
-              <a:rPr lang="he-IL" smtClean="0"/>
+              <a:rPr lang="he-IL"/>
               <a:t>רמה שלישית</a:t>
             </a:r>
           </a:p>
           <a:p>
             <a:pPr lvl="3"/>
             <a:r>
-              <a:rPr lang="he-IL" smtClean="0"/>
+              <a:rPr lang="he-IL"/>
               <a:t>רמה רביעית</a:t>
             </a:r>
           </a:p>
           <a:p>
             <a:pPr lvl="4"/>
             <a:r>
-              <a:rPr lang="he-IL" smtClean="0"/>
+              <a:rPr lang="he-IL"/>
               <a:t>רמה חמישית</a:t>
             </a:r>
-            <a:endParaRPr lang="he-IL"/>
           </a:p>
         </p:txBody>
       </p:sp>
@@ -2183,7 +2185,7 @@
           <a:p>
             <a:pPr lvl="0"/>
             <a:r>
-              <a:rPr lang="he-IL" smtClean="0"/>
+              <a:rPr lang="he-IL"/>
               <a:t>לחץ כדי לערוך סגנונות טקסט של תבנית בסיס</a:t>
             </a:r>
           </a:p>
@@ -2206,7 +2208,7 @@
           <a:p>
             <a:fld id="{4E7438E1-117D-44FB-AC24-B79D899BA877}" type="datetimeFigureOut">
               <a:rPr lang="he-IL" smtClean="0"/>
-              <a:t>ט"ו/אלול/תשס"ו</a:t>
+              <a:t>ט'/ניסן/תשפ"א</a:t>
             </a:fld>
             <a:endParaRPr lang="he-IL"/>
           </a:p>
@@ -2304,10 +2306,9 @@
           </a:lstStyle>
           <a:p>
             <a:r>
-              <a:rPr lang="he-IL" smtClean="0"/>
+              <a:rPr lang="he-IL"/>
               <a:t>לחץ כדי לערוך סגנון כותרת של תבנית בסיס</a:t>
             </a:r>
-            <a:endParaRPr lang="he-IL"/>
           </a:p>
         </p:txBody>
       </p:sp>
@@ -2431,7 +2432,7 @@
           <a:p>
             <a:pPr lvl="0"/>
             <a:r>
-              <a:rPr lang="he-IL" smtClean="0"/>
+              <a:rPr lang="he-IL"/>
               <a:t>לחץ כדי לערוך סגנונות טקסט של תבנית בסיס</a:t>
             </a:r>
           </a:p>
@@ -2454,7 +2455,7 @@
           <a:p>
             <a:fld id="{4E7438E1-117D-44FB-AC24-B79D899BA877}" type="datetimeFigureOut">
               <a:rPr lang="he-IL" smtClean="0"/>
-              <a:t>ט"ו/אלול/תשס"ו</a:t>
+              <a:t>ט'/ניסן/תשפ"א</a:t>
             </a:fld>
             <a:endParaRPr lang="he-IL"/>
           </a:p>
@@ -2558,10 +2559,9 @@
           <a:lstStyle/>
           <a:p>
             <a:r>
-              <a:rPr lang="he-IL" smtClean="0"/>
+              <a:rPr lang="he-IL"/>
               <a:t>לחץ כדי לערוך סגנון כותרת של תבנית בסיס</a:t>
             </a:r>
-            <a:endParaRPr lang="he-IL"/>
           </a:p>
         </p:txBody>
       </p:sp>
@@ -2592,38 +2592,37 @@
           <a:p>
             <a:pPr lvl="0"/>
             <a:r>
-              <a:rPr lang="he-IL" smtClean="0"/>
+              <a:rPr lang="he-IL"/>
               <a:t>לחץ כדי לערוך סגנונות טקסט של תבנית בסיס</a:t>
             </a:r>
           </a:p>
           <a:p>
             <a:pPr lvl="1"/>
             <a:r>
-              <a:rPr lang="he-IL" smtClean="0"/>
+              <a:rPr lang="he-IL"/>
               <a:t>רמה שנייה</a:t>
             </a:r>
           </a:p>
           <a:p>
             <a:pPr lvl="2"/>
             <a:r>
-              <a:rPr lang="he-IL" smtClean="0"/>
+              <a:rPr lang="he-IL"/>
               <a:t>רמה שלישית</a:t>
             </a:r>
           </a:p>
           <a:p>
             <a:pPr lvl="3"/>
             <a:r>
-              <a:rPr lang="he-IL" smtClean="0"/>
+              <a:rPr lang="he-IL"/>
               <a:t>רמה רביעית</a:t>
             </a:r>
           </a:p>
           <a:p>
             <a:pPr lvl="4"/>
             <a:r>
-              <a:rPr lang="he-IL" smtClean="0"/>
+              <a:rPr lang="he-IL"/>
               <a:t>רמה חמישית</a:t>
             </a:r>
-            <a:endParaRPr lang="he-IL"/>
           </a:p>
         </p:txBody>
       </p:sp>
@@ -2662,7 +2661,7 @@
           <a:p>
             <a:fld id="{4E7438E1-117D-44FB-AC24-B79D899BA877}" type="datetimeFigureOut">
               <a:rPr lang="he-IL" smtClean="0"/>
-              <a:t>ט"ו/אלול/תשס"ו</a:t>
+              <a:t>ט'/ניסן/תשפ"א</a:t>
             </a:fld>
             <a:endParaRPr lang="he-IL"/>
           </a:p>
@@ -3013,6 +3012,234 @@
     </p:otherStyle>
   </p:txStyles>
 </p:sldMaster>
+</file>
+
+<file path=ppt/slides/slide1.xml><?xml version="1.0" encoding="utf-8"?>
+<p:sld xmlns:a="http://schemas.openxmlformats.org/drawingml/2006/main" xmlns:r="http://schemas.openxmlformats.org/officeDocument/2006/relationships" xmlns:p="http://schemas.openxmlformats.org/presentationml/2006/main">
+  <p:cSld>
+    <p:spTree>
+      <p:nvGrpSpPr>
+        <p:cNvPr id="1" name=""/>
+        <p:cNvGrpSpPr/>
+        <p:nvPr/>
+      </p:nvGrpSpPr>
+      <p:grpSpPr>
+        <a:xfrm>
+          <a:off x="0" y="0"/>
+          <a:ext cx="0" cy="0"/>
+          <a:chOff x="0" y="0"/>
+          <a:chExt cx="0" cy="0"/>
+        </a:xfrm>
+      </p:grpSpPr>
+      <p:sp>
+        <p:nvSpPr>
+          <p:cNvPr id="4" name="חץ: מעוקל ימינה 3">
+            <a:extLst>
+              <a:ext uri="{FF2B5EF4-FFF2-40B4-BE49-F238E27FC236}">
+                <a16:creationId xmlns:a16="http://schemas.microsoft.com/office/drawing/2014/main" id="{54EBF7F2-71FF-4C74-8A23-66C2D6595CD0}"/>
+              </a:ext>
+            </a:extLst>
+          </p:cNvPr>
+          <p:cNvSpPr/>
+          <p:nvPr/>
+        </p:nvSpPr>
+        <p:spPr>
+          <a:xfrm>
+            <a:off x="1763688" y="1340768"/>
+            <a:ext cx="1008112" cy="3024336"/>
+          </a:xfrm>
+          <a:prstGeom prst="curvedRightArrow">
+            <a:avLst/>
+          </a:prstGeom>
+        </p:spPr>
+        <p:style>
+          <a:lnRef idx="2">
+            <a:schemeClr val="accent1">
+              <a:shade val="50000"/>
+            </a:schemeClr>
+          </a:lnRef>
+          <a:fillRef idx="1">
+            <a:schemeClr val="accent1"/>
+          </a:fillRef>
+          <a:effectRef idx="0">
+            <a:schemeClr val="accent1"/>
+          </a:effectRef>
+          <a:fontRef idx="minor">
+            <a:schemeClr val="lt1"/>
+          </a:fontRef>
+        </p:style>
+        <p:txBody>
+          <a:bodyPr rtlCol="1" anchor="ctr"/>
+          <a:lstStyle/>
+          <a:p>
+            <a:pPr algn="ctr"/>
+            <a:endParaRPr lang="he-IL">
+              <a:solidFill>
+                <a:schemeClr val="tx1"/>
+              </a:solidFill>
+            </a:endParaRPr>
+          </a:p>
+        </p:txBody>
+      </p:sp>
+    </p:spTree>
+    <p:extLst>
+      <p:ext uri="{BB962C8B-B14F-4D97-AF65-F5344CB8AC3E}">
+        <p14:creationId xmlns:p14="http://schemas.microsoft.com/office/powerpoint/2010/main" val="684437105"/>
+      </p:ext>
+    </p:extLst>
+  </p:cSld>
+  <p:clrMapOvr>
+    <a:masterClrMapping/>
+  </p:clrMapOvr>
+</p:sld>
+</file>
+
+<file path=ppt/slides/slide2.xml><?xml version="1.0" encoding="utf-8"?>
+<p:sld xmlns:a="http://schemas.openxmlformats.org/drawingml/2006/main" xmlns:r="http://schemas.openxmlformats.org/officeDocument/2006/relationships" xmlns:p="http://schemas.openxmlformats.org/presentationml/2006/main">
+  <p:cSld>
+    <p:spTree>
+      <p:nvGrpSpPr>
+        <p:cNvPr id="1" name=""/>
+        <p:cNvGrpSpPr/>
+        <p:nvPr/>
+      </p:nvGrpSpPr>
+      <p:grpSpPr>
+        <a:xfrm>
+          <a:off x="0" y="0"/>
+          <a:ext cx="0" cy="0"/>
+          <a:chOff x="0" y="0"/>
+          <a:chExt cx="0" cy="0"/>
+        </a:xfrm>
+      </p:grpSpPr>
+      <p:pic>
+        <p:nvPicPr>
+          <p:cNvPr id="14" name="תמונה 13">
+            <a:extLst>
+              <a:ext uri="{FF2B5EF4-FFF2-40B4-BE49-F238E27FC236}">
+                <a16:creationId xmlns:a16="http://schemas.microsoft.com/office/drawing/2014/main" id="{470F301C-2C4D-468F-852C-D786CBD05BA6}"/>
+              </a:ext>
+            </a:extLst>
+          </p:cNvPr>
+          <p:cNvPicPr>
+            <a:picLocks noChangeAspect="1"/>
+          </p:cNvPicPr>
+          <p:nvPr/>
+        </p:nvPicPr>
+        <p:blipFill rotWithShape="1">
+          <a:blip r:embed="rId2">
+            <a:extLst>
+              <a:ext uri="{28A0092B-C50C-407E-A947-70E740481C1C}">
+                <a14:useLocalDpi xmlns:a14="http://schemas.microsoft.com/office/drawing/2010/main" val="0"/>
+              </a:ext>
+            </a:extLst>
+          </a:blip>
+          <a:srcRect b="34924"/>
+          <a:stretch/>
+        </p:blipFill>
+        <p:spPr>
+          <a:xfrm>
+            <a:off x="1967403" y="1268760"/>
+            <a:ext cx="2328874" cy="2880320"/>
+          </a:xfrm>
+          <a:prstGeom prst="rect">
+            <a:avLst/>
+          </a:prstGeom>
+        </p:spPr>
+      </p:pic>
+      <p:sp>
+        <p:nvSpPr>
+          <p:cNvPr id="10" name="חץ: מעוקל שמאלה 9">
+            <a:extLst>
+              <a:ext uri="{FF2B5EF4-FFF2-40B4-BE49-F238E27FC236}">
+                <a16:creationId xmlns:a16="http://schemas.microsoft.com/office/drawing/2014/main" id="{B456646F-C22F-4E0C-AF41-3B5F668F6168}"/>
+              </a:ext>
+            </a:extLst>
+          </p:cNvPr>
+          <p:cNvSpPr/>
+          <p:nvPr/>
+        </p:nvSpPr>
+        <p:spPr>
+          <a:xfrm flipH="1" flipV="1">
+            <a:off x="3131840" y="1124744"/>
+            <a:ext cx="2304256" cy="4464496"/>
+          </a:xfrm>
+          <a:prstGeom prst="curvedLeftArrow">
+            <a:avLst/>
+          </a:prstGeom>
+        </p:spPr>
+        <p:style>
+          <a:lnRef idx="2">
+            <a:schemeClr val="dk1"/>
+          </a:lnRef>
+          <a:fillRef idx="1">
+            <a:schemeClr val="lt1"/>
+          </a:fillRef>
+          <a:effectRef idx="0">
+            <a:schemeClr val="dk1"/>
+          </a:effectRef>
+          <a:fontRef idx="minor">
+            <a:schemeClr val="dk1"/>
+          </a:fontRef>
+        </p:style>
+        <p:txBody>
+          <a:bodyPr rtlCol="1" anchor="ctr"/>
+          <a:lstStyle/>
+          <a:p>
+            <a:pPr algn="ctr"/>
+            <a:endParaRPr lang="he-IL">
+              <a:solidFill>
+                <a:schemeClr val="tx1"/>
+              </a:solidFill>
+            </a:endParaRPr>
+          </a:p>
+        </p:txBody>
+      </p:sp>
+      <p:pic>
+        <p:nvPicPr>
+          <p:cNvPr id="15" name="תמונה 14">
+            <a:extLst>
+              <a:ext uri="{FF2B5EF4-FFF2-40B4-BE49-F238E27FC236}">
+                <a16:creationId xmlns:a16="http://schemas.microsoft.com/office/drawing/2014/main" id="{4293EA9C-DAE1-4BEF-8466-1303CB8BEF1A}"/>
+              </a:ext>
+            </a:extLst>
+          </p:cNvPr>
+          <p:cNvPicPr>
+            <a:picLocks noChangeAspect="1"/>
+          </p:cNvPicPr>
+          <p:nvPr/>
+        </p:nvPicPr>
+        <p:blipFill rotWithShape="1">
+          <a:blip r:embed="rId2">
+            <a:extLst>
+              <a:ext uri="{28A0092B-C50C-407E-A947-70E740481C1C}">
+                <a14:useLocalDpi xmlns:a14="http://schemas.microsoft.com/office/drawing/2010/main" val="0"/>
+              </a:ext>
+            </a:extLst>
+          </a:blip>
+          <a:srcRect t="60169"/>
+          <a:stretch/>
+        </p:blipFill>
+        <p:spPr>
+          <a:xfrm>
+            <a:off x="1967403" y="3933056"/>
+            <a:ext cx="2328874" cy="1762940"/>
+          </a:xfrm>
+          <a:prstGeom prst="rect">
+            <a:avLst/>
+          </a:prstGeom>
+        </p:spPr>
+      </p:pic>
+    </p:spTree>
+    <p:extLst>
+      <p:ext uri="{BB962C8B-B14F-4D97-AF65-F5344CB8AC3E}">
+        <p14:creationId xmlns:p14="http://schemas.microsoft.com/office/powerpoint/2010/main" val="1298678664"/>
+      </p:ext>
+    </p:extLst>
+  </p:cSld>
+  <p:clrMapOvr>
+    <a:masterClrMapping/>
+  </p:clrMapOvr>
+</p:sld>
 </file>
 
 <file path=ppt/theme/theme1.xml><?xml version="1.0" encoding="utf-8"?>

</xml_diff>